<commit_message>
Added OS motivations for sprint
</commit_message>
<xml_diff>
--- a/Presentations/20200416 OGC API Tiles Webinar slides.pptx
+++ b/Presentations/20200416 OGC API Tiles Webinar slides.pptx
@@ -5734,7 +5734,7 @@
         </p:nvSpPr>
         <p:spPr>
           <a:xfrm>
-            <a:off x="307181" y="3086100"/>
+            <a:off x="307181" y="103598"/>
             <a:ext cx="11577637" cy="685800"/>
           </a:xfrm>
         </p:spPr>
@@ -5778,6 +5778,157 @@
               <a:t>Copyright © 2020 Open Geospatial Consortium</a:t>
             </a:r>
             <a:endParaRPr lang="en-US" dirty="0"/>
+          </a:p>
+        </p:txBody>
+      </p:sp>
+      <p:sp>
+        <p:nvSpPr>
+          <p:cNvPr id="5" name="TextBox 4">
+            <a:extLst>
+              <a:ext uri="{FF2B5EF4-FFF2-40B4-BE49-F238E27FC236}">
+                <a16:creationId xmlns:a16="http://schemas.microsoft.com/office/drawing/2014/main" id="{47A4F7F5-6D05-47D4-8299-B9DF1B754380}"/>
+              </a:ext>
+            </a:extLst>
+          </p:cNvPr>
+          <p:cNvSpPr txBox="1"/>
+          <p:nvPr/>
+        </p:nvSpPr>
+        <p:spPr>
+          <a:xfrm>
+            <a:off x="685800" y="1828800"/>
+            <a:ext cx="11199018" cy="4114800"/>
+          </a:xfrm>
+          <a:prstGeom prst="rect">
+            <a:avLst/>
+          </a:prstGeom>
+          <a:noFill/>
+        </p:spPr>
+        <p:txBody>
+          <a:bodyPr wrap="none" rtlCol="0">
+            <a:noAutofit/>
+          </a:bodyPr>
+          <a:lstStyle/>
+          <a:p>
+            <a:pPr marL="457200" indent="-457200">
+              <a:buFont typeface="Arial" panose="020B0604020202020204" pitchFamily="34" charset="0"/>
+              <a:buChar char="•"/>
+            </a:pPr>
+            <a:r>
+              <a:rPr lang="en-GB" sz="2400" dirty="0">
+                <a:solidFill>
+                  <a:schemeClr val="tx2"/>
+                </a:solidFill>
+                <a:latin typeface="+mn-lt"/>
+              </a:rPr>
+              <a:t>Ensuring there are modern API standards for common app elements</a:t>
+            </a:r>
+          </a:p>
+          <a:p>
+            <a:pPr marL="457200" indent="-457200">
+              <a:buFont typeface="Arial" panose="020B0604020202020204" pitchFamily="34" charset="0"/>
+              <a:buChar char="•"/>
+            </a:pPr>
+            <a:endParaRPr lang="en-GB" sz="2400" dirty="0">
+              <a:solidFill>
+                <a:schemeClr val="tx2"/>
+              </a:solidFill>
+              <a:latin typeface="+mn-lt"/>
+            </a:endParaRPr>
+          </a:p>
+          <a:p>
+            <a:pPr marL="457200" indent="-457200">
+              <a:buFont typeface="Arial" panose="020B0604020202020204" pitchFamily="34" charset="0"/>
+              <a:buChar char="•"/>
+            </a:pPr>
+            <a:r>
+              <a:rPr lang="en-GB" sz="2400" dirty="0">
+                <a:solidFill>
+                  <a:schemeClr val="tx2"/>
+                </a:solidFill>
+                <a:latin typeface="+mn-lt"/>
+              </a:rPr>
+              <a:t>WMTS is the most used OGC web service standard – let’s make sure the </a:t>
+            </a:r>
+          </a:p>
+          <a:p>
+            <a:r>
+              <a:rPr lang="en-GB" sz="2400" dirty="0">
+                <a:solidFill>
+                  <a:schemeClr val="tx2"/>
+                </a:solidFill>
+                <a:latin typeface="+mn-lt"/>
+              </a:rPr>
+              <a:t>      next generation is too!</a:t>
+            </a:r>
+          </a:p>
+          <a:p>
+            <a:endParaRPr lang="en-GB" sz="2400" dirty="0">
+              <a:solidFill>
+                <a:schemeClr val="tx2"/>
+              </a:solidFill>
+              <a:latin typeface="+mn-lt"/>
+            </a:endParaRPr>
+          </a:p>
+          <a:p>
+            <a:pPr marL="342900" indent="-342900">
+              <a:buFont typeface="Arial" panose="020B0604020202020204" pitchFamily="34" charset="0"/>
+              <a:buChar char="•"/>
+            </a:pPr>
+            <a:r>
+              <a:rPr lang="en-GB" sz="2400" dirty="0">
+                <a:solidFill>
+                  <a:schemeClr val="tx2"/>
+                </a:solidFill>
+                <a:latin typeface="+mn-lt"/>
+              </a:rPr>
+              <a:t>Over the next few years, OS will be creating the next-generation of </a:t>
+            </a:r>
+          </a:p>
+          <a:p>
+            <a:r>
+              <a:rPr lang="en-GB" sz="2400" dirty="0">
+                <a:solidFill>
+                  <a:schemeClr val="tx2"/>
+                </a:solidFill>
+                <a:latin typeface="+mn-lt"/>
+              </a:rPr>
+              <a:t>    authoritative data for Great Britain</a:t>
+            </a:r>
+          </a:p>
+          <a:p>
+            <a:endParaRPr lang="en-GB" sz="2400" dirty="0">
+              <a:solidFill>
+                <a:schemeClr val="tx2"/>
+              </a:solidFill>
+              <a:latin typeface="+mn-lt"/>
+            </a:endParaRPr>
+          </a:p>
+          <a:p>
+            <a:r>
+              <a:rPr lang="en-GB" sz="2400" dirty="0">
+                <a:solidFill>
+                  <a:schemeClr val="tx2"/>
+                </a:solidFill>
+                <a:latin typeface="+mn-lt"/>
+              </a:rPr>
+              <a:t> – we want to provide access using modern, easy to use OGC standards </a:t>
+            </a:r>
+            <a:r>
+              <a:rPr lang="en-GB" sz="2400" dirty="0">
+                <a:solidFill>
+                  <a:schemeClr val="tx2"/>
+                </a:solidFill>
+                <a:latin typeface="+mn-lt"/>
+                <a:sym typeface="Wingdings" panose="05000000000000000000" pitchFamily="2" charset="2"/>
+              </a:rPr>
+              <a:t></a:t>
+            </a:r>
+            <a:endParaRPr lang="en-GB" sz="2400" dirty="0">
+              <a:solidFill>
+                <a:schemeClr val="tx2"/>
+              </a:solidFill>
+              <a:latin typeface="+mn-lt"/>
+            </a:endParaRPr>
           </a:p>
         </p:txBody>
       </p:sp>

</xml_diff>

<commit_message>
Update 20200416 OGC API Tiles Webinar slides.pptx
</commit_message>
<xml_diff>
--- a/Presentations/20200416 OGC API Tiles Webinar slides.pptx
+++ b/Presentations/20200416 OGC API Tiles Webinar slides.pptx
@@ -5,10 +5,10 @@
     <p:sldMasterId id="2147483654" r:id="rId1"/>
   </p:sldMasterIdLst>
   <p:notesMasterIdLst>
-    <p:notesMasterId r:id="rId12"/>
+    <p:notesMasterId r:id="rId13"/>
   </p:notesMasterIdLst>
   <p:handoutMasterIdLst>
-    <p:handoutMasterId r:id="rId13"/>
+    <p:handoutMasterId r:id="rId14"/>
   </p:handoutMasterIdLst>
   <p:sldIdLst>
     <p:sldId id="256" r:id="rId2"/>
@@ -18,9 +18,10 @@
     <p:sldId id="270" r:id="rId6"/>
     <p:sldId id="271" r:id="rId7"/>
     <p:sldId id="272" r:id="rId8"/>
-    <p:sldId id="265" r:id="rId9"/>
-    <p:sldId id="266" r:id="rId10"/>
-    <p:sldId id="267" r:id="rId11"/>
+    <p:sldId id="273" r:id="rId9"/>
+    <p:sldId id="274" r:id="rId10"/>
+    <p:sldId id="266" r:id="rId11"/>
+    <p:sldId id="267" r:id="rId12"/>
   </p:sldIdLst>
   <p:sldSz cx="12192000" cy="6858000"/>
   <p:notesSz cx="6904038" cy="9220200"/>
@@ -934,6 +935,96 @@
     </a:lvl9pPr>
   </p:notesStyle>
 </p:notesMaster>
+</file>
+
+<file path=ppt/notesSlides/notesSlide1.xml><?xml version="1.0" encoding="utf-8"?>
+<p:notes xmlns:a="http://schemas.openxmlformats.org/drawingml/2006/main" xmlns:r="http://schemas.openxmlformats.org/officeDocument/2006/relationships" xmlns:p="http://schemas.openxmlformats.org/presentationml/2006/main">
+  <p:cSld>
+    <p:spTree>
+      <p:nvGrpSpPr>
+        <p:cNvPr id="1" name=""/>
+        <p:cNvGrpSpPr/>
+        <p:nvPr/>
+      </p:nvGrpSpPr>
+      <p:grpSpPr>
+        <a:xfrm>
+          <a:off x="0" y="0"/>
+          <a:ext cx="0" cy="0"/>
+          <a:chOff x="0" y="0"/>
+          <a:chExt cx="0" cy="0"/>
+        </a:xfrm>
+      </p:grpSpPr>
+      <p:sp>
+        <p:nvSpPr>
+          <p:cNvPr id="2" name="Slide Image Placeholder 1"/>
+          <p:cNvSpPr>
+            <a:spLocks noGrp="1" noRot="1" noChangeAspect="1"/>
+          </p:cNvSpPr>
+          <p:nvPr>
+            <p:ph type="sldImg"/>
+          </p:nvPr>
+        </p:nvSpPr>
+        <p:spPr/>
+      </p:sp>
+      <p:sp>
+        <p:nvSpPr>
+          <p:cNvPr id="3" name="Notes Placeholder 2"/>
+          <p:cNvSpPr>
+            <a:spLocks noGrp="1"/>
+          </p:cNvSpPr>
+          <p:nvPr>
+            <p:ph type="body" idx="1"/>
+          </p:nvPr>
+        </p:nvSpPr>
+        <p:spPr/>
+        <p:txBody>
+          <a:bodyPr/>
+          <a:lstStyle/>
+          <a:p>
+            <a:endParaRPr lang="en-US" dirty="0"/>
+          </a:p>
+        </p:txBody>
+      </p:sp>
+      <p:sp>
+        <p:nvSpPr>
+          <p:cNvPr id="4" name="Slide Number Placeholder 3"/>
+          <p:cNvSpPr>
+            <a:spLocks noGrp="1"/>
+          </p:cNvSpPr>
+          <p:nvPr>
+            <p:ph type="sldNum" sz="quarter" idx="5"/>
+          </p:nvPr>
+        </p:nvSpPr>
+        <p:spPr/>
+        <p:txBody>
+          <a:bodyPr/>
+          <a:lstStyle/>
+          <a:p>
+            <a:pPr>
+              <a:defRPr/>
+            </a:pPr>
+            <a:fld id="{42277D4B-7A01-0E4F-9227-433F239B3FD1}" type="slidenum">
+              <a:rPr lang="en-US" altLang="en-US" smtClean="0"/>
+              <a:pPr>
+                <a:defRPr/>
+              </a:pPr>
+              <a:t>9</a:t>
+            </a:fld>
+            <a:endParaRPr lang="en-US" altLang="en-US"/>
+          </a:p>
+        </p:txBody>
+      </p:sp>
+    </p:spTree>
+    <p:extLst>
+      <p:ext uri="{BB962C8B-B14F-4D97-AF65-F5344CB8AC3E}">
+        <p14:creationId xmlns:p14="http://schemas.microsoft.com/office/powerpoint/2010/main" val="3897084936"/>
+      </p:ext>
+    </p:extLst>
+  </p:cSld>
+  <p:clrMapOvr>
+    <a:masterClrMapping/>
+  </p:clrMapOvr>
+</p:notes>
 </file>
 
 <file path=ppt/slideLayouts/slideLayout1.xml><?xml version="1.0" encoding="utf-8"?>
@@ -5090,7 +5181,7 @@
           <p:cNvPr id="2" name="Title 1">
             <a:extLst>
               <a:ext uri="{FF2B5EF4-FFF2-40B4-BE49-F238E27FC236}">
-                <a16:creationId xmlns:a16="http://schemas.microsoft.com/office/drawing/2014/main" id="{7A68DD32-E6BB-5A4E-B0E5-19D82BFC953A}"/>
+                <a16:creationId xmlns:a16="http://schemas.microsoft.com/office/drawing/2014/main" id="{C4AF49DD-D170-D149-AF13-A3EC3E584624}"/>
               </a:ext>
             </a:extLst>
           </p:cNvPr>
@@ -5108,6 +5199,320 @@
           <a:p>
             <a:r>
               <a:rPr lang="en-US" dirty="0"/>
+              <a:t>Sprint Schedule – April 24</a:t>
+            </a:r>
+            <a:r>
+              <a:rPr lang="en-US" baseline="30000" dirty="0"/>
+              <a:t>th</a:t>
+            </a:r>
+            <a:r>
+              <a:rPr lang="en-US" dirty="0"/>
+              <a:t>, 2020</a:t>
+            </a:r>
+          </a:p>
+        </p:txBody>
+      </p:sp>
+      <p:sp>
+        <p:nvSpPr>
+          <p:cNvPr id="4" name="Footer Placeholder 3">
+            <a:extLst>
+              <a:ext uri="{FF2B5EF4-FFF2-40B4-BE49-F238E27FC236}">
+                <a16:creationId xmlns:a16="http://schemas.microsoft.com/office/drawing/2014/main" id="{D1FB0E12-A309-1D45-856B-FB51FA806BA6}"/>
+              </a:ext>
+            </a:extLst>
+          </p:cNvPr>
+          <p:cNvSpPr>
+            <a:spLocks noGrp="1"/>
+          </p:cNvSpPr>
+          <p:nvPr>
+            <p:ph type="ftr" sz="quarter" idx="10"/>
+          </p:nvPr>
+        </p:nvSpPr>
+        <p:spPr/>
+        <p:txBody>
+          <a:bodyPr/>
+          <a:lstStyle/>
+          <a:p>
+            <a:pPr>
+              <a:defRPr/>
+            </a:pPr>
+            <a:r>
+              <a:rPr lang="en-US"/>
+              <a:t>Copyright © 2020 Open Geospatial Consortium</a:t>
+            </a:r>
+            <a:endParaRPr lang="en-US" dirty="0"/>
+          </a:p>
+        </p:txBody>
+      </p:sp>
+      <p:pic>
+        <p:nvPicPr>
+          <p:cNvPr id="8" name="Picture 7" descr="A screenshot of a cell phone&#10;&#10;Description automatically generated">
+            <a:extLst>
+              <a:ext uri="{FF2B5EF4-FFF2-40B4-BE49-F238E27FC236}">
+                <a16:creationId xmlns:a16="http://schemas.microsoft.com/office/drawing/2014/main" id="{C9CF3472-23A4-604C-850B-0DF16D11EE41}"/>
+              </a:ext>
+            </a:extLst>
+          </p:cNvPr>
+          <p:cNvPicPr>
+            <a:picLocks noChangeAspect="1"/>
+          </p:cNvPicPr>
+          <p:nvPr/>
+        </p:nvPicPr>
+        <p:blipFill>
+          <a:blip r:embed="rId2">
+            <a:extLst>
+              <a:ext uri="{28A0092B-C50C-407E-A947-70E740481C1C}">
+                <a14:useLocalDpi xmlns:a14="http://schemas.microsoft.com/office/drawing/2010/main" val="0"/>
+              </a:ext>
+            </a:extLst>
+          </a:blip>
+          <a:stretch>
+            <a:fillRect/>
+          </a:stretch>
+        </p:blipFill>
+        <p:spPr>
+          <a:xfrm>
+            <a:off x="762000" y="932850"/>
+            <a:ext cx="11182350" cy="5233000"/>
+          </a:xfrm>
+          <a:prstGeom prst="rect">
+            <a:avLst/>
+          </a:prstGeom>
+        </p:spPr>
+      </p:pic>
+      <p:pic>
+        <p:nvPicPr>
+          <p:cNvPr id="9" name="Picture 8">
+            <a:extLst>
+              <a:ext uri="{FF2B5EF4-FFF2-40B4-BE49-F238E27FC236}">
+                <a16:creationId xmlns:a16="http://schemas.microsoft.com/office/drawing/2014/main" id="{D38D2A43-92DF-874D-B2F4-E9DD89151676}"/>
+              </a:ext>
+            </a:extLst>
+          </p:cNvPr>
+          <p:cNvPicPr>
+            <a:picLocks noChangeAspect="1"/>
+          </p:cNvPicPr>
+          <p:nvPr/>
+        </p:nvPicPr>
+        <p:blipFill>
+          <a:blip r:embed="rId3">
+            <a:extLst>
+              <a:ext uri="{28A0092B-C50C-407E-A947-70E740481C1C}">
+                <a14:useLocalDpi xmlns:a14="http://schemas.microsoft.com/office/drawing/2010/main" val="0"/>
+              </a:ext>
+            </a:extLst>
+          </a:blip>
+          <a:stretch>
+            <a:fillRect/>
+          </a:stretch>
+        </p:blipFill>
+        <p:spPr>
+          <a:xfrm>
+            <a:off x="7848600" y="1219200"/>
+            <a:ext cx="215900" cy="215900"/>
+          </a:xfrm>
+          <a:prstGeom prst="rect">
+            <a:avLst/>
+          </a:prstGeom>
+        </p:spPr>
+      </p:pic>
+      <p:pic>
+        <p:nvPicPr>
+          <p:cNvPr id="10" name="Picture 9">
+            <a:extLst>
+              <a:ext uri="{FF2B5EF4-FFF2-40B4-BE49-F238E27FC236}">
+                <a16:creationId xmlns:a16="http://schemas.microsoft.com/office/drawing/2014/main" id="{B71F9F69-D32D-5243-A15E-A7194649973F}"/>
+              </a:ext>
+            </a:extLst>
+          </p:cNvPr>
+          <p:cNvPicPr>
+            <a:picLocks noChangeAspect="1"/>
+          </p:cNvPicPr>
+          <p:nvPr/>
+        </p:nvPicPr>
+        <p:blipFill>
+          <a:blip r:embed="rId3">
+            <a:extLst>
+              <a:ext uri="{28A0092B-C50C-407E-A947-70E740481C1C}">
+                <a14:useLocalDpi xmlns:a14="http://schemas.microsoft.com/office/drawing/2010/main" val="0"/>
+              </a:ext>
+            </a:extLst>
+          </a:blip>
+          <a:stretch>
+            <a:fillRect/>
+          </a:stretch>
+        </p:blipFill>
+        <p:spPr>
+          <a:xfrm>
+            <a:off x="7848600" y="3160923"/>
+            <a:ext cx="215900" cy="215900"/>
+          </a:xfrm>
+          <a:prstGeom prst="rect">
+            <a:avLst/>
+          </a:prstGeom>
+        </p:spPr>
+      </p:pic>
+      <p:pic>
+        <p:nvPicPr>
+          <p:cNvPr id="11" name="Picture 10">
+            <a:extLst>
+              <a:ext uri="{FF2B5EF4-FFF2-40B4-BE49-F238E27FC236}">
+                <a16:creationId xmlns:a16="http://schemas.microsoft.com/office/drawing/2014/main" id="{0C15025B-5572-4043-8640-A4D876FE1CC3}"/>
+              </a:ext>
+            </a:extLst>
+          </p:cNvPr>
+          <p:cNvPicPr>
+            <a:picLocks noChangeAspect="1"/>
+          </p:cNvPicPr>
+          <p:nvPr/>
+        </p:nvPicPr>
+        <p:blipFill>
+          <a:blip r:embed="rId3">
+            <a:extLst>
+              <a:ext uri="{28A0092B-C50C-407E-A947-70E740481C1C}">
+                <a14:useLocalDpi xmlns:a14="http://schemas.microsoft.com/office/drawing/2010/main" val="0"/>
+              </a:ext>
+            </a:extLst>
+          </a:blip>
+          <a:stretch>
+            <a:fillRect/>
+          </a:stretch>
+        </p:blipFill>
+        <p:spPr>
+          <a:xfrm>
+            <a:off x="7848600" y="4406326"/>
+            <a:ext cx="215900" cy="215900"/>
+          </a:xfrm>
+          <a:prstGeom prst="rect">
+            <a:avLst/>
+          </a:prstGeom>
+        </p:spPr>
+      </p:pic>
+      <p:pic>
+        <p:nvPicPr>
+          <p:cNvPr id="12" name="Picture 11">
+            <a:extLst>
+              <a:ext uri="{FF2B5EF4-FFF2-40B4-BE49-F238E27FC236}">
+                <a16:creationId xmlns:a16="http://schemas.microsoft.com/office/drawing/2014/main" id="{9D7A5634-8328-D44A-9D1F-6701075E633B}"/>
+              </a:ext>
+            </a:extLst>
+          </p:cNvPr>
+          <p:cNvPicPr>
+            <a:picLocks noChangeAspect="1"/>
+          </p:cNvPicPr>
+          <p:nvPr/>
+        </p:nvPicPr>
+        <p:blipFill>
+          <a:blip r:embed="rId3">
+            <a:extLst>
+              <a:ext uri="{28A0092B-C50C-407E-A947-70E740481C1C}">
+                <a14:useLocalDpi xmlns:a14="http://schemas.microsoft.com/office/drawing/2010/main" val="0"/>
+              </a:ext>
+            </a:extLst>
+          </a:blip>
+          <a:stretch>
+            <a:fillRect/>
+          </a:stretch>
+        </p:blipFill>
+        <p:spPr>
+          <a:xfrm>
+            <a:off x="7848600" y="5070188"/>
+            <a:ext cx="215900" cy="215900"/>
+          </a:xfrm>
+          <a:prstGeom prst="rect">
+            <a:avLst/>
+          </a:prstGeom>
+        </p:spPr>
+      </p:pic>
+      <p:pic>
+        <p:nvPicPr>
+          <p:cNvPr id="13" name="Picture 12">
+            <a:extLst>
+              <a:ext uri="{FF2B5EF4-FFF2-40B4-BE49-F238E27FC236}">
+                <a16:creationId xmlns:a16="http://schemas.microsoft.com/office/drawing/2014/main" id="{7EDDE51B-6D95-3A49-B88C-724E34855B2A}"/>
+              </a:ext>
+            </a:extLst>
+          </p:cNvPr>
+          <p:cNvPicPr>
+            <a:picLocks noChangeAspect="1"/>
+          </p:cNvPicPr>
+          <p:nvPr/>
+        </p:nvPicPr>
+        <p:blipFill>
+          <a:blip r:embed="rId3">
+            <a:extLst>
+              <a:ext uri="{28A0092B-C50C-407E-A947-70E740481C1C}">
+                <a14:useLocalDpi xmlns:a14="http://schemas.microsoft.com/office/drawing/2010/main" val="0"/>
+              </a:ext>
+            </a:extLst>
+          </a:blip>
+          <a:stretch>
+            <a:fillRect/>
+          </a:stretch>
+        </p:blipFill>
+        <p:spPr>
+          <a:xfrm>
+            <a:off x="7848600" y="5673438"/>
+            <a:ext cx="215900" cy="215900"/>
+          </a:xfrm>
+          <a:prstGeom prst="rect">
+            <a:avLst/>
+          </a:prstGeom>
+        </p:spPr>
+      </p:pic>
+    </p:spTree>
+    <p:extLst>
+      <p:ext uri="{BB962C8B-B14F-4D97-AF65-F5344CB8AC3E}">
+        <p14:creationId xmlns:p14="http://schemas.microsoft.com/office/powerpoint/2010/main" val="1571253530"/>
+      </p:ext>
+    </p:extLst>
+  </p:cSld>
+  <p:clrMapOvr>
+    <a:masterClrMapping/>
+  </p:clrMapOvr>
+</p:sld>
+</file>
+
+<file path=ppt/slides/slide11.xml><?xml version="1.0" encoding="utf-8"?>
+<p:sld xmlns:a="http://schemas.openxmlformats.org/drawingml/2006/main" xmlns:r="http://schemas.openxmlformats.org/officeDocument/2006/relationships" xmlns:p="http://schemas.openxmlformats.org/presentationml/2006/main">
+  <p:cSld>
+    <p:spTree>
+      <p:nvGrpSpPr>
+        <p:cNvPr id="1" name=""/>
+        <p:cNvGrpSpPr/>
+        <p:nvPr/>
+      </p:nvGrpSpPr>
+      <p:grpSpPr>
+        <a:xfrm>
+          <a:off x="0" y="0"/>
+          <a:ext cx="0" cy="0"/>
+          <a:chOff x="0" y="0"/>
+          <a:chExt cx="0" cy="0"/>
+        </a:xfrm>
+      </p:grpSpPr>
+      <p:sp>
+        <p:nvSpPr>
+          <p:cNvPr id="2" name="Title 1">
+            <a:extLst>
+              <a:ext uri="{FF2B5EF4-FFF2-40B4-BE49-F238E27FC236}">
+                <a16:creationId xmlns:a16="http://schemas.microsoft.com/office/drawing/2014/main" id="{7A68DD32-E6BB-5A4E-B0E5-19D82BFC953A}"/>
+              </a:ext>
+            </a:extLst>
+          </p:cNvPr>
+          <p:cNvSpPr>
+            <a:spLocks noGrp="1"/>
+          </p:cNvSpPr>
+          <p:nvPr>
+            <p:ph type="title"/>
+          </p:nvPr>
+        </p:nvSpPr>
+        <p:spPr/>
+        <p:txBody>
+          <a:bodyPr/>
+          <a:lstStyle/>
+          <a:p>
+            <a:r>
+              <a:rPr lang="en-US" dirty="0"/>
               <a:t>Logistics</a:t>
             </a:r>
           </a:p>
@@ -5160,31 +5565,34 @@
           </a:p>
           <a:p>
             <a:pPr lvl="1"/>
-            <a:r>
-              <a:rPr lang="en-US" dirty="0"/>
-              <a:t>One persistent meeting room</a:t>
-            </a:r>
-          </a:p>
-          <a:p>
-            <a:pPr lvl="1"/>
-            <a:endParaRPr lang="en-US" dirty="0"/>
-          </a:p>
-          <a:p>
-            <a:r>
-              <a:rPr lang="en-US" dirty="0"/>
-              <a:t>GitHub</a:t>
-            </a:r>
-          </a:p>
-          <a:p>
-            <a:pPr lvl="1"/>
-            <a:r>
-              <a:rPr lang="en-US" dirty="0"/>
-              <a:t>Public repo </a:t>
-            </a:r>
             <a:r>
               <a:rPr lang="en-US" dirty="0">
                 <a:hlinkClick r:id="rId2"/>
               </a:rPr>
+              <a:t>https://gitter.im/opengeospatial/OGC-OS-Sprint-04-2020</a:t>
+            </a:r>
+            <a:endParaRPr lang="en-US" dirty="0"/>
+          </a:p>
+          <a:p>
+            <a:pPr lvl="1"/>
+            <a:endParaRPr lang="en-US" dirty="0"/>
+          </a:p>
+          <a:p>
+            <a:r>
+              <a:rPr lang="en-US" dirty="0"/>
+              <a:t>GitHub</a:t>
+            </a:r>
+          </a:p>
+          <a:p>
+            <a:pPr lvl="1"/>
+            <a:r>
+              <a:rPr lang="en-US" dirty="0"/>
+              <a:t>Public repo </a:t>
+            </a:r>
+            <a:r>
+              <a:rPr lang="en-US" dirty="0">
+                <a:hlinkClick r:id="rId3"/>
+              </a:rPr>
               <a:t>https://github.com/opengeospatial/OGC-OS-Sprint-04-2020</a:t>
             </a:r>
             <a:endParaRPr lang="en-US" dirty="0"/>
@@ -5238,7 +5646,7 @@
     </p:spTree>
     <p:extLst>
       <p:ext uri="{BB962C8B-B14F-4D97-AF65-F5344CB8AC3E}">
-        <p14:creationId xmlns:p14="http://schemas.microsoft.com/office/powerpoint/2010/main" val="1871037859"/>
+        <p14:creationId xmlns:p14="http://schemas.microsoft.com/office/powerpoint/2010/main" val="1126595948"/>
       </p:ext>
     </p:extLst>
   </p:cSld>
@@ -6252,7 +6660,7 @@
           <p:cNvPr id="2" name="Title 1">
             <a:extLst>
               <a:ext uri="{FF2B5EF4-FFF2-40B4-BE49-F238E27FC236}">
-                <a16:creationId xmlns:a16="http://schemas.microsoft.com/office/drawing/2014/main" id="{C4AF49DD-D170-D149-AF13-A3EC3E584624}"/>
+                <a16:creationId xmlns:a16="http://schemas.microsoft.com/office/drawing/2014/main" id="{3DE412DA-15D0-6849-8278-AD2E4E8FAF30}"/>
               </a:ext>
             </a:extLst>
           </p:cNvPr>
@@ -6270,15 +6678,78 @@
           <a:p>
             <a:r>
               <a:rPr lang="en-US" dirty="0"/>
-              <a:t>Sprint Schedule – April 23</a:t>
-            </a:r>
-            <a:r>
-              <a:rPr lang="en-US" baseline="30000" dirty="0"/>
-              <a:t>rd</a:t>
-            </a:r>
-            <a:r>
-              <a:rPr lang="en-US" dirty="0"/>
-              <a:t>, 2020</a:t>
+              <a:t>Sprint Description</a:t>
+            </a:r>
+          </a:p>
+        </p:txBody>
+      </p:sp>
+      <p:sp>
+        <p:nvSpPr>
+          <p:cNvPr id="3" name="Content Placeholder 2">
+            <a:extLst>
+              <a:ext uri="{FF2B5EF4-FFF2-40B4-BE49-F238E27FC236}">
+                <a16:creationId xmlns:a16="http://schemas.microsoft.com/office/drawing/2014/main" id="{0A1DDDB8-BFFB-0E4A-83B7-CA30EFB8DB7D}"/>
+              </a:ext>
+            </a:extLst>
+          </p:cNvPr>
+          <p:cNvSpPr>
+            <a:spLocks noGrp="1"/>
+          </p:cNvSpPr>
+          <p:nvPr>
+            <p:ph idx="1"/>
+          </p:nvPr>
+        </p:nvSpPr>
+        <p:spPr/>
+        <p:txBody>
+          <a:bodyPr/>
+          <a:lstStyle/>
+          <a:p>
+            <a:r>
+              <a:rPr lang="en-US" sz="2000" dirty="0"/>
+              <a:t>The scope of the code sprint is to include API development and testing, using one or more implementations of </a:t>
+            </a:r>
+            <a:r>
+              <a:rPr lang="en-US" sz="2000" dirty="0" err="1"/>
+              <a:t>OpenAPI</a:t>
+            </a:r>
+            <a:r>
+              <a:rPr lang="en-US" sz="2000" dirty="0"/>
+              <a:t> 3.0 (the successor of Swagger).</a:t>
+            </a:r>
+          </a:p>
+          <a:p>
+            <a:endParaRPr lang="en-US" sz="2000" dirty="0"/>
+          </a:p>
+          <a:p>
+            <a:r>
+              <a:rPr lang="en-US" sz="2000" dirty="0"/>
+              <a:t>Participants are welcome to bring partial or complete implementations of servers or clients to support the sprint. </a:t>
+            </a:r>
+          </a:p>
+          <a:p>
+            <a:endParaRPr lang="en-US" sz="2000" dirty="0"/>
+          </a:p>
+          <a:p>
+            <a:r>
+              <a:rPr lang="en-US" sz="2000" dirty="0"/>
+              <a:t>Following an explanation of the current draft, participants will have the opportunity to experiment with parts of the specification and develop working services. </a:t>
+            </a:r>
+          </a:p>
+          <a:p>
+            <a:endParaRPr lang="en-US" sz="2000" dirty="0"/>
+          </a:p>
+          <a:p>
+            <a:r>
+              <a:rPr lang="en-US" sz="2000" dirty="0"/>
+              <a:t>This development can either be done with source data that participants bring to the event themselves or with source data made available by Ordnance Survey and other data sponsors, such as OS </a:t>
+            </a:r>
+            <a:r>
+              <a:rPr lang="en-US" sz="2000" dirty="0" err="1"/>
+              <a:t>ZoomStack</a:t>
+            </a:r>
+            <a:r>
+              <a:rPr lang="en-US" sz="2000" dirty="0"/>
+              <a:t>.</a:t>
             </a:r>
           </a:p>
         </p:txBody>
@@ -6288,7 +6759,7 @@
           <p:cNvPr id="4" name="Footer Placeholder 3">
             <a:extLst>
               <a:ext uri="{FF2B5EF4-FFF2-40B4-BE49-F238E27FC236}">
-                <a16:creationId xmlns:a16="http://schemas.microsoft.com/office/drawing/2014/main" id="{D1FB0E12-A309-1D45-856B-FB51FA806BA6}"/>
+                <a16:creationId xmlns:a16="http://schemas.microsoft.com/office/drawing/2014/main" id="{307E9AB1-9D95-8741-8559-66D9100430C3}"/>
               </a:ext>
             </a:extLst>
           </p:cNvPr>
@@ -6315,226 +6786,10 @@
           </a:p>
         </p:txBody>
       </p:sp>
-      <p:pic>
-        <p:nvPicPr>
-          <p:cNvPr id="6" name="Picture 5" descr="A screenshot of a cell phone&#10;&#10;Description automatically generated">
-            <a:extLst>
-              <a:ext uri="{FF2B5EF4-FFF2-40B4-BE49-F238E27FC236}">
-                <a16:creationId xmlns:a16="http://schemas.microsoft.com/office/drawing/2014/main" id="{03C346F8-94E0-614B-A5A0-467954635CD2}"/>
-              </a:ext>
-            </a:extLst>
-          </p:cNvPr>
-          <p:cNvPicPr>
-            <a:picLocks noChangeAspect="1"/>
-          </p:cNvPicPr>
-          <p:nvPr/>
-        </p:nvPicPr>
-        <p:blipFill>
-          <a:blip r:embed="rId2">
-            <a:extLst>
-              <a:ext uri="{28A0092B-C50C-407E-A947-70E740481C1C}">
-                <a14:useLocalDpi xmlns:a14="http://schemas.microsoft.com/office/drawing/2010/main" val="0"/>
-              </a:ext>
-            </a:extLst>
-          </a:blip>
-          <a:stretch>
-            <a:fillRect/>
-          </a:stretch>
-        </p:blipFill>
-        <p:spPr>
-          <a:xfrm>
-            <a:off x="1905000" y="986798"/>
-            <a:ext cx="9159472" cy="5871202"/>
-          </a:xfrm>
-          <a:prstGeom prst="rect">
-            <a:avLst/>
-          </a:prstGeom>
-        </p:spPr>
-      </p:pic>
-      <p:pic>
-        <p:nvPicPr>
-          <p:cNvPr id="8" name="Picture 7">
-            <a:extLst>
-              <a:ext uri="{FF2B5EF4-FFF2-40B4-BE49-F238E27FC236}">
-                <a16:creationId xmlns:a16="http://schemas.microsoft.com/office/drawing/2014/main" id="{558CB612-5406-CA40-8992-756B158ED6A3}"/>
-              </a:ext>
-            </a:extLst>
-          </p:cNvPr>
-          <p:cNvPicPr>
-            <a:picLocks noChangeAspect="1"/>
-          </p:cNvPicPr>
-          <p:nvPr/>
-        </p:nvPicPr>
-        <p:blipFill>
-          <a:blip r:embed="rId3">
-            <a:extLst>
-              <a:ext uri="{28A0092B-C50C-407E-A947-70E740481C1C}">
-                <a14:useLocalDpi xmlns:a14="http://schemas.microsoft.com/office/drawing/2010/main" val="0"/>
-              </a:ext>
-            </a:extLst>
-          </a:blip>
-          <a:stretch>
-            <a:fillRect/>
-          </a:stretch>
-        </p:blipFill>
-        <p:spPr>
-          <a:xfrm>
-            <a:off x="7848600" y="1219200"/>
-            <a:ext cx="215900" cy="215900"/>
-          </a:xfrm>
-          <a:prstGeom prst="rect">
-            <a:avLst/>
-          </a:prstGeom>
-        </p:spPr>
-      </p:pic>
-      <p:pic>
-        <p:nvPicPr>
-          <p:cNvPr id="9" name="Picture 8">
-            <a:extLst>
-              <a:ext uri="{FF2B5EF4-FFF2-40B4-BE49-F238E27FC236}">
-                <a16:creationId xmlns:a16="http://schemas.microsoft.com/office/drawing/2014/main" id="{04A64929-6FB9-484C-BC1B-A986F0D18142}"/>
-              </a:ext>
-            </a:extLst>
-          </p:cNvPr>
-          <p:cNvPicPr>
-            <a:picLocks noChangeAspect="1"/>
-          </p:cNvPicPr>
-          <p:nvPr/>
-        </p:nvPicPr>
-        <p:blipFill>
-          <a:blip r:embed="rId3">
-            <a:extLst>
-              <a:ext uri="{28A0092B-C50C-407E-A947-70E740481C1C}">
-                <a14:useLocalDpi xmlns:a14="http://schemas.microsoft.com/office/drawing/2010/main" val="0"/>
-              </a:ext>
-            </a:extLst>
-          </a:blip>
-          <a:stretch>
-            <a:fillRect/>
-          </a:stretch>
-        </p:blipFill>
-        <p:spPr>
-          <a:xfrm>
-            <a:off x="7848600" y="1981200"/>
-            <a:ext cx="215900" cy="215900"/>
-          </a:xfrm>
-          <a:prstGeom prst="rect">
-            <a:avLst/>
-          </a:prstGeom>
-        </p:spPr>
-      </p:pic>
-      <p:pic>
-        <p:nvPicPr>
-          <p:cNvPr id="10" name="Picture 9">
-            <a:extLst>
-              <a:ext uri="{FF2B5EF4-FFF2-40B4-BE49-F238E27FC236}">
-                <a16:creationId xmlns:a16="http://schemas.microsoft.com/office/drawing/2014/main" id="{92906F7D-EABE-7044-A04B-45B19ADDB456}"/>
-              </a:ext>
-            </a:extLst>
-          </p:cNvPr>
-          <p:cNvPicPr>
-            <a:picLocks noChangeAspect="1"/>
-          </p:cNvPicPr>
-          <p:nvPr/>
-        </p:nvPicPr>
-        <p:blipFill>
-          <a:blip r:embed="rId3">
-            <a:extLst>
-              <a:ext uri="{28A0092B-C50C-407E-A947-70E740481C1C}">
-                <a14:useLocalDpi xmlns:a14="http://schemas.microsoft.com/office/drawing/2010/main" val="0"/>
-              </a:ext>
-            </a:extLst>
-          </a:blip>
-          <a:stretch>
-            <a:fillRect/>
-          </a:stretch>
-        </p:blipFill>
-        <p:spPr>
-          <a:xfrm>
-            <a:off x="7848600" y="3870222"/>
-            <a:ext cx="215900" cy="215900"/>
-          </a:xfrm>
-          <a:prstGeom prst="rect">
-            <a:avLst/>
-          </a:prstGeom>
-        </p:spPr>
-      </p:pic>
-      <p:pic>
-        <p:nvPicPr>
-          <p:cNvPr id="11" name="Picture 10">
-            <a:extLst>
-              <a:ext uri="{FF2B5EF4-FFF2-40B4-BE49-F238E27FC236}">
-                <a16:creationId xmlns:a16="http://schemas.microsoft.com/office/drawing/2014/main" id="{2264FE60-430D-9D45-8101-CD0961C3A344}"/>
-              </a:ext>
-            </a:extLst>
-          </p:cNvPr>
-          <p:cNvPicPr>
-            <a:picLocks noChangeAspect="1"/>
-          </p:cNvPicPr>
-          <p:nvPr/>
-        </p:nvPicPr>
-        <p:blipFill>
-          <a:blip r:embed="rId3">
-            <a:extLst>
-              <a:ext uri="{28A0092B-C50C-407E-A947-70E740481C1C}">
-                <a14:useLocalDpi xmlns:a14="http://schemas.microsoft.com/office/drawing/2010/main" val="0"/>
-              </a:ext>
-            </a:extLst>
-          </a:blip>
-          <a:stretch>
-            <a:fillRect/>
-          </a:stretch>
-        </p:blipFill>
-        <p:spPr>
-          <a:xfrm>
-            <a:off x="7848600" y="5422900"/>
-            <a:ext cx="215900" cy="215900"/>
-          </a:xfrm>
-          <a:prstGeom prst="rect">
-            <a:avLst/>
-          </a:prstGeom>
-        </p:spPr>
-      </p:pic>
-      <p:pic>
-        <p:nvPicPr>
-          <p:cNvPr id="12" name="Picture 11">
-            <a:extLst>
-              <a:ext uri="{FF2B5EF4-FFF2-40B4-BE49-F238E27FC236}">
-                <a16:creationId xmlns:a16="http://schemas.microsoft.com/office/drawing/2014/main" id="{F54DA81D-17C7-3647-9979-A81B703A798A}"/>
-              </a:ext>
-            </a:extLst>
-          </p:cNvPr>
-          <p:cNvPicPr>
-            <a:picLocks noChangeAspect="1"/>
-          </p:cNvPicPr>
-          <p:nvPr/>
-        </p:nvPicPr>
-        <p:blipFill>
-          <a:blip r:embed="rId3">
-            <a:extLst>
-              <a:ext uri="{28A0092B-C50C-407E-A947-70E740481C1C}">
-                <a14:useLocalDpi xmlns:a14="http://schemas.microsoft.com/office/drawing/2010/main" val="0"/>
-              </a:ext>
-            </a:extLst>
-          </a:blip>
-          <a:stretch>
-            <a:fillRect/>
-          </a:stretch>
-        </p:blipFill>
-        <p:spPr>
-          <a:xfrm>
-            <a:off x="7848600" y="6476923"/>
-            <a:ext cx="215900" cy="215900"/>
-          </a:xfrm>
-          <a:prstGeom prst="rect">
-            <a:avLst/>
-          </a:prstGeom>
-        </p:spPr>
-      </p:pic>
     </p:spTree>
     <p:extLst>
       <p:ext uri="{BB962C8B-B14F-4D97-AF65-F5344CB8AC3E}">
-        <p14:creationId xmlns:p14="http://schemas.microsoft.com/office/powerpoint/2010/main" val="2321371942"/>
+        <p14:creationId xmlns:p14="http://schemas.microsoft.com/office/powerpoint/2010/main" val="9980227"/>
       </p:ext>
     </p:extLst>
   </p:cSld>
@@ -6561,116 +6816,12 @@
           <a:chExt cx="0" cy="0"/>
         </a:xfrm>
       </p:grpSpPr>
-      <p:sp>
-        <p:nvSpPr>
-          <p:cNvPr id="2" name="Title 1">
-            <a:extLst>
-              <a:ext uri="{FF2B5EF4-FFF2-40B4-BE49-F238E27FC236}">
-                <a16:creationId xmlns:a16="http://schemas.microsoft.com/office/drawing/2014/main" id="{C4AF49DD-D170-D149-AF13-A3EC3E584624}"/>
-              </a:ext>
-            </a:extLst>
-          </p:cNvPr>
-          <p:cNvSpPr>
-            <a:spLocks noGrp="1"/>
-          </p:cNvSpPr>
-          <p:nvPr>
-            <p:ph type="title"/>
-          </p:nvPr>
-        </p:nvSpPr>
-        <p:spPr/>
-        <p:txBody>
-          <a:bodyPr/>
-          <a:lstStyle/>
-          <a:p>
-            <a:r>
-              <a:rPr lang="en-US" dirty="0"/>
-              <a:t>Sprint Schedule – April 24</a:t>
-            </a:r>
-            <a:r>
-              <a:rPr lang="en-US" baseline="30000" dirty="0"/>
-              <a:t>th</a:t>
-            </a:r>
-            <a:r>
-              <a:rPr lang="en-US" dirty="0"/>
-              <a:t>, 2020</a:t>
-            </a:r>
-          </a:p>
-        </p:txBody>
-      </p:sp>
-      <p:sp>
-        <p:nvSpPr>
-          <p:cNvPr id="4" name="Footer Placeholder 3">
-            <a:extLst>
-              <a:ext uri="{FF2B5EF4-FFF2-40B4-BE49-F238E27FC236}">
-                <a16:creationId xmlns:a16="http://schemas.microsoft.com/office/drawing/2014/main" id="{D1FB0E12-A309-1D45-856B-FB51FA806BA6}"/>
-              </a:ext>
-            </a:extLst>
-          </p:cNvPr>
-          <p:cNvSpPr>
-            <a:spLocks noGrp="1"/>
-          </p:cNvSpPr>
-          <p:nvPr>
-            <p:ph type="ftr" sz="quarter" idx="10"/>
-          </p:nvPr>
-        </p:nvSpPr>
-        <p:spPr/>
-        <p:txBody>
-          <a:bodyPr/>
-          <a:lstStyle/>
-          <a:p>
-            <a:pPr>
-              <a:defRPr/>
-            </a:pPr>
-            <a:r>
-              <a:rPr lang="en-US"/>
-              <a:t>Copyright © 2020 Open Geospatial Consortium</a:t>
-            </a:r>
-            <a:endParaRPr lang="en-US" dirty="0"/>
-          </a:p>
-        </p:txBody>
-      </p:sp>
       <p:pic>
         <p:nvPicPr>
-          <p:cNvPr id="8" name="Picture 7" descr="A screenshot of a cell phone&#10;&#10;Description automatically generated">
+          <p:cNvPr id="5" name="Picture 4" descr="A screenshot of a cell phone&#10;&#10;Description automatically generated">
             <a:extLst>
               <a:ext uri="{FF2B5EF4-FFF2-40B4-BE49-F238E27FC236}">
-                <a16:creationId xmlns:a16="http://schemas.microsoft.com/office/drawing/2014/main" id="{C9CF3472-23A4-604C-850B-0DF16D11EE41}"/>
-              </a:ext>
-            </a:extLst>
-          </p:cNvPr>
-          <p:cNvPicPr>
-            <a:picLocks noChangeAspect="1"/>
-          </p:cNvPicPr>
-          <p:nvPr/>
-        </p:nvPicPr>
-        <p:blipFill>
-          <a:blip r:embed="rId2">
-            <a:extLst>
-              <a:ext uri="{28A0092B-C50C-407E-A947-70E740481C1C}">
-                <a14:useLocalDpi xmlns:a14="http://schemas.microsoft.com/office/drawing/2010/main" val="0"/>
-              </a:ext>
-            </a:extLst>
-          </a:blip>
-          <a:stretch>
-            <a:fillRect/>
-          </a:stretch>
-        </p:blipFill>
-        <p:spPr>
-          <a:xfrm>
-            <a:off x="762000" y="932850"/>
-            <a:ext cx="11182350" cy="5233000"/>
-          </a:xfrm>
-          <a:prstGeom prst="rect">
-            <a:avLst/>
-          </a:prstGeom>
-        </p:spPr>
-      </p:pic>
-      <p:pic>
-        <p:nvPicPr>
-          <p:cNvPr id="9" name="Picture 8">
-            <a:extLst>
-              <a:ext uri="{FF2B5EF4-FFF2-40B4-BE49-F238E27FC236}">
-                <a16:creationId xmlns:a16="http://schemas.microsoft.com/office/drawing/2014/main" id="{D38D2A43-92DF-874D-B2F4-E9DD89151676}"/>
+                <a16:creationId xmlns:a16="http://schemas.microsoft.com/office/drawing/2014/main" id="{FEA143E5-0B15-1A4B-90C4-2C0F5FD2CF94}"/>
               </a:ext>
             </a:extLst>
           </p:cNvPr>
@@ -6681,6 +6832,110 @@
         </p:nvPicPr>
         <p:blipFill>
           <a:blip r:embed="rId3">
+            <a:extLst>
+              <a:ext uri="{28A0092B-C50C-407E-A947-70E740481C1C}">
+                <a14:useLocalDpi xmlns:a14="http://schemas.microsoft.com/office/drawing/2010/main" val="0"/>
+              </a:ext>
+            </a:extLst>
+          </a:blip>
+          <a:stretch>
+            <a:fillRect/>
+          </a:stretch>
+        </p:blipFill>
+        <p:spPr>
+          <a:xfrm>
+            <a:off x="2666999" y="940930"/>
+            <a:ext cx="8154767" cy="5917070"/>
+          </a:xfrm>
+          <a:prstGeom prst="rect">
+            <a:avLst/>
+          </a:prstGeom>
+        </p:spPr>
+      </p:pic>
+      <p:sp>
+        <p:nvSpPr>
+          <p:cNvPr id="2" name="Title 1">
+            <a:extLst>
+              <a:ext uri="{FF2B5EF4-FFF2-40B4-BE49-F238E27FC236}">
+                <a16:creationId xmlns:a16="http://schemas.microsoft.com/office/drawing/2014/main" id="{C4AF49DD-D170-D149-AF13-A3EC3E584624}"/>
+              </a:ext>
+            </a:extLst>
+          </p:cNvPr>
+          <p:cNvSpPr>
+            <a:spLocks noGrp="1"/>
+          </p:cNvSpPr>
+          <p:nvPr>
+            <p:ph type="title"/>
+          </p:nvPr>
+        </p:nvSpPr>
+        <p:spPr/>
+        <p:txBody>
+          <a:bodyPr/>
+          <a:lstStyle/>
+          <a:p>
+            <a:r>
+              <a:rPr lang="en-US" dirty="0"/>
+              <a:t>Sprint Schedule – April 23</a:t>
+            </a:r>
+            <a:r>
+              <a:rPr lang="en-US" baseline="30000" dirty="0"/>
+              <a:t>rd</a:t>
+            </a:r>
+            <a:r>
+              <a:rPr lang="en-US" dirty="0"/>
+              <a:t>, 2020</a:t>
+            </a:r>
+          </a:p>
+        </p:txBody>
+      </p:sp>
+      <p:sp>
+        <p:nvSpPr>
+          <p:cNvPr id="4" name="Footer Placeholder 3">
+            <a:extLst>
+              <a:ext uri="{FF2B5EF4-FFF2-40B4-BE49-F238E27FC236}">
+                <a16:creationId xmlns:a16="http://schemas.microsoft.com/office/drawing/2014/main" id="{D1FB0E12-A309-1D45-856B-FB51FA806BA6}"/>
+              </a:ext>
+            </a:extLst>
+          </p:cNvPr>
+          <p:cNvSpPr>
+            <a:spLocks noGrp="1"/>
+          </p:cNvSpPr>
+          <p:nvPr>
+            <p:ph type="ftr" sz="quarter" idx="10"/>
+          </p:nvPr>
+        </p:nvSpPr>
+        <p:spPr/>
+        <p:txBody>
+          <a:bodyPr/>
+          <a:lstStyle/>
+          <a:p>
+            <a:pPr>
+              <a:defRPr/>
+            </a:pPr>
+            <a:r>
+              <a:rPr lang="en-US"/>
+              <a:t>Copyright © 2020 Open Geospatial Consortium</a:t>
+            </a:r>
+            <a:endParaRPr lang="en-US" dirty="0"/>
+          </a:p>
+        </p:txBody>
+      </p:sp>
+      <p:pic>
+        <p:nvPicPr>
+          <p:cNvPr id="8" name="Picture 7">
+            <a:extLst>
+              <a:ext uri="{FF2B5EF4-FFF2-40B4-BE49-F238E27FC236}">
+                <a16:creationId xmlns:a16="http://schemas.microsoft.com/office/drawing/2014/main" id="{558CB612-5406-CA40-8992-756B158ED6A3}"/>
+              </a:ext>
+            </a:extLst>
+          </p:cNvPr>
+          <p:cNvPicPr>
+            <a:picLocks noChangeAspect="1"/>
+          </p:cNvPicPr>
+          <p:nvPr/>
+        </p:nvPicPr>
+        <p:blipFill>
+          <a:blip r:embed="rId4">
             <a:extLst>
               <a:ext uri="{28A0092B-C50C-407E-A947-70E740481C1C}">
                 <a14:useLocalDpi xmlns:a14="http://schemas.microsoft.com/office/drawing/2010/main" val="0"/>
@@ -6703,10 +6958,10 @@
       </p:pic>
       <p:pic>
         <p:nvPicPr>
-          <p:cNvPr id="10" name="Picture 9">
+          <p:cNvPr id="9" name="Picture 8">
             <a:extLst>
               <a:ext uri="{FF2B5EF4-FFF2-40B4-BE49-F238E27FC236}">
-                <a16:creationId xmlns:a16="http://schemas.microsoft.com/office/drawing/2014/main" id="{B71F9F69-D32D-5243-A15E-A7194649973F}"/>
+                <a16:creationId xmlns:a16="http://schemas.microsoft.com/office/drawing/2014/main" id="{04A64929-6FB9-484C-BC1B-A986F0D18142}"/>
               </a:ext>
             </a:extLst>
           </p:cNvPr>
@@ -6716,7 +6971,7 @@
           <p:nvPr/>
         </p:nvPicPr>
         <p:blipFill>
-          <a:blip r:embed="rId3">
+          <a:blip r:embed="rId4">
             <a:extLst>
               <a:ext uri="{28A0092B-C50C-407E-A947-70E740481C1C}">
                 <a14:useLocalDpi xmlns:a14="http://schemas.microsoft.com/office/drawing/2010/main" val="0"/>
@@ -6729,7 +6984,43 @@
         </p:blipFill>
         <p:spPr>
           <a:xfrm>
-            <a:off x="7848600" y="3160923"/>
+            <a:off x="7848600" y="1981200"/>
+            <a:ext cx="215900" cy="215900"/>
+          </a:xfrm>
+          <a:prstGeom prst="rect">
+            <a:avLst/>
+          </a:prstGeom>
+        </p:spPr>
+      </p:pic>
+      <p:pic>
+        <p:nvPicPr>
+          <p:cNvPr id="10" name="Picture 9">
+            <a:extLst>
+              <a:ext uri="{FF2B5EF4-FFF2-40B4-BE49-F238E27FC236}">
+                <a16:creationId xmlns:a16="http://schemas.microsoft.com/office/drawing/2014/main" id="{92906F7D-EABE-7044-A04B-45B19ADDB456}"/>
+              </a:ext>
+            </a:extLst>
+          </p:cNvPr>
+          <p:cNvPicPr>
+            <a:picLocks noChangeAspect="1"/>
+          </p:cNvPicPr>
+          <p:nvPr/>
+        </p:nvPicPr>
+        <p:blipFill>
+          <a:blip r:embed="rId4">
+            <a:extLst>
+              <a:ext uri="{28A0092B-C50C-407E-A947-70E740481C1C}">
+                <a14:useLocalDpi xmlns:a14="http://schemas.microsoft.com/office/drawing/2010/main" val="0"/>
+              </a:ext>
+            </a:extLst>
+          </a:blip>
+          <a:stretch>
+            <a:fillRect/>
+          </a:stretch>
+        </p:blipFill>
+        <p:spPr>
+          <a:xfrm>
+            <a:off x="7848600" y="3531165"/>
             <a:ext cx="215900" cy="215900"/>
           </a:xfrm>
           <a:prstGeom prst="rect">
@@ -6742,7 +7033,7 @@
           <p:cNvPr id="11" name="Picture 10">
             <a:extLst>
               <a:ext uri="{FF2B5EF4-FFF2-40B4-BE49-F238E27FC236}">
-                <a16:creationId xmlns:a16="http://schemas.microsoft.com/office/drawing/2014/main" id="{0C15025B-5572-4043-8640-A4D876FE1CC3}"/>
+                <a16:creationId xmlns:a16="http://schemas.microsoft.com/office/drawing/2014/main" id="{2264FE60-430D-9D45-8101-CD0961C3A344}"/>
               </a:ext>
             </a:extLst>
           </p:cNvPr>
@@ -6752,7 +7043,7 @@
           <p:nvPr/>
         </p:nvPicPr>
         <p:blipFill>
-          <a:blip r:embed="rId3">
+          <a:blip r:embed="rId4">
             <a:extLst>
               <a:ext uri="{28A0092B-C50C-407E-A947-70E740481C1C}">
                 <a14:useLocalDpi xmlns:a14="http://schemas.microsoft.com/office/drawing/2010/main" val="0"/>
@@ -6765,7 +7056,7 @@
         </p:blipFill>
         <p:spPr>
           <a:xfrm>
-            <a:off x="7848600" y="4406326"/>
+            <a:off x="7848600" y="5422900"/>
             <a:ext cx="215900" cy="215900"/>
           </a:xfrm>
           <a:prstGeom prst="rect">
@@ -6778,7 +7069,7 @@
           <p:cNvPr id="12" name="Picture 11">
             <a:extLst>
               <a:ext uri="{FF2B5EF4-FFF2-40B4-BE49-F238E27FC236}">
-                <a16:creationId xmlns:a16="http://schemas.microsoft.com/office/drawing/2014/main" id="{9D7A5634-8328-D44A-9D1F-6701075E633B}"/>
+                <a16:creationId xmlns:a16="http://schemas.microsoft.com/office/drawing/2014/main" id="{F54DA81D-17C7-3647-9979-A81B703A798A}"/>
               </a:ext>
             </a:extLst>
           </p:cNvPr>
@@ -6788,7 +7079,7 @@
           <p:nvPr/>
         </p:nvPicPr>
         <p:blipFill>
-          <a:blip r:embed="rId3">
+          <a:blip r:embed="rId4">
             <a:extLst>
               <a:ext uri="{28A0092B-C50C-407E-A947-70E740481C1C}">
                 <a14:useLocalDpi xmlns:a14="http://schemas.microsoft.com/office/drawing/2010/main" val="0"/>
@@ -6801,7 +7092,7 @@
         </p:blipFill>
         <p:spPr>
           <a:xfrm>
-            <a:off x="7848600" y="5070188"/>
+            <a:off x="7848600" y="6476923"/>
             <a:ext cx="215900" cy="215900"/>
           </a:xfrm>
           <a:prstGeom prst="rect">
@@ -6811,10 +7102,10 @@
       </p:pic>
       <p:pic>
         <p:nvPicPr>
-          <p:cNvPr id="13" name="Picture 12">
+          <p:cNvPr id="16" name="Picture 15">
             <a:extLst>
               <a:ext uri="{FF2B5EF4-FFF2-40B4-BE49-F238E27FC236}">
-                <a16:creationId xmlns:a16="http://schemas.microsoft.com/office/drawing/2014/main" id="{7EDDE51B-6D95-3A49-B88C-724E34855B2A}"/>
+                <a16:creationId xmlns:a16="http://schemas.microsoft.com/office/drawing/2014/main" id="{1C8C583A-AECA-364F-860E-C4DF2A31FD1D}"/>
               </a:ext>
             </a:extLst>
           </p:cNvPr>
@@ -6824,7 +7115,7 @@
           <p:nvPr/>
         </p:nvPicPr>
         <p:blipFill>
-          <a:blip r:embed="rId3">
+          <a:blip r:embed="rId4">
             <a:extLst>
               <a:ext uri="{28A0092B-C50C-407E-A947-70E740481C1C}">
                 <a14:useLocalDpi xmlns:a14="http://schemas.microsoft.com/office/drawing/2010/main" val="0"/>
@@ -6837,7 +7128,7 @@
         </p:blipFill>
         <p:spPr>
           <a:xfrm>
-            <a:off x="7848600" y="5673438"/>
+            <a:off x="7848600" y="4839518"/>
             <a:ext cx="215900" cy="215900"/>
           </a:xfrm>
           <a:prstGeom prst="rect">
@@ -6845,16 +7136,595 @@
           </a:prstGeom>
         </p:spPr>
       </p:pic>
+      <p:sp>
+        <p:nvSpPr>
+          <p:cNvPr id="17" name="Rounded Rectangle 16">
+            <a:extLst>
+              <a:ext uri="{FF2B5EF4-FFF2-40B4-BE49-F238E27FC236}">
+                <a16:creationId xmlns:a16="http://schemas.microsoft.com/office/drawing/2014/main" id="{CDD32295-194E-1242-B087-5DEC49E1C10E}"/>
+              </a:ext>
+            </a:extLst>
+          </p:cNvPr>
+          <p:cNvSpPr/>
+          <p:nvPr/>
+        </p:nvSpPr>
+        <p:spPr bwMode="auto">
+          <a:xfrm>
+            <a:off x="8231188" y="4267200"/>
+            <a:ext cx="3427412" cy="457200"/>
+          </a:xfrm>
+          <a:prstGeom prst="roundRect">
+            <a:avLst/>
+          </a:prstGeom>
+          <a:solidFill>
+            <a:schemeClr val="accent1"/>
+          </a:solidFill>
+          <a:ln w="12700" cap="flat" cmpd="sng" algn="ctr">
+            <a:solidFill>
+              <a:srgbClr val="969696"/>
+            </a:solidFill>
+            <a:prstDash val="solid"/>
+            <a:round/>
+            <a:headEnd type="none" w="med" len="med"/>
+            <a:tailEnd type="none" w="med" len="med"/>
+          </a:ln>
+          <a:effectLst/>
+        </p:spPr>
+        <p:txBody>
+          <a:bodyPr rtlCol="0" anchor="ctr"/>
+          <a:lstStyle/>
+          <a:p>
+            <a:pPr algn="ctr"/>
+            <a:r>
+              <a:rPr lang="en-US" sz="1400" dirty="0">
+                <a:solidFill>
+                  <a:schemeClr val="bg1"/>
+                </a:solidFill>
+                <a:latin typeface="Arial" panose="020B0604020202020204" pitchFamily="34" charset="0"/>
+                <a:cs typeface="Arial" panose="020B0604020202020204" pitchFamily="34" charset="0"/>
+              </a:rPr>
+              <a:t>Implement the API spec &amp; </a:t>
+            </a:r>
+          </a:p>
+          <a:p>
+            <a:pPr algn="ctr"/>
+            <a:r>
+              <a:rPr lang="en-US" sz="1400" dirty="0">
+                <a:solidFill>
+                  <a:schemeClr val="bg1"/>
+                </a:solidFill>
+                <a:latin typeface="Arial" panose="020B0604020202020204" pitchFamily="34" charset="0"/>
+                <a:cs typeface="Arial" panose="020B0604020202020204" pitchFamily="34" charset="0"/>
+              </a:rPr>
+              <a:t>log any issues encountered</a:t>
+            </a:r>
+          </a:p>
+        </p:txBody>
+      </p:sp>
+      <p:sp>
+        <p:nvSpPr>
+          <p:cNvPr id="18" name="Rounded Rectangle 17">
+            <a:extLst>
+              <a:ext uri="{FF2B5EF4-FFF2-40B4-BE49-F238E27FC236}">
+                <a16:creationId xmlns:a16="http://schemas.microsoft.com/office/drawing/2014/main" id="{6E579153-F86E-4640-ADE7-2B6D790B05D7}"/>
+              </a:ext>
+            </a:extLst>
+          </p:cNvPr>
+          <p:cNvSpPr/>
+          <p:nvPr/>
+        </p:nvSpPr>
+        <p:spPr bwMode="auto">
+          <a:xfrm>
+            <a:off x="8231188" y="4724400"/>
+            <a:ext cx="3427412" cy="457200"/>
+          </a:xfrm>
+          <a:prstGeom prst="roundRect">
+            <a:avLst/>
+          </a:prstGeom>
+          <a:solidFill>
+            <a:schemeClr val="accent6">
+              <a:lumMod val="50000"/>
+            </a:schemeClr>
+          </a:solidFill>
+          <a:ln w="12700" cap="flat" cmpd="sng" algn="ctr">
+            <a:solidFill>
+              <a:srgbClr val="969696"/>
+            </a:solidFill>
+            <a:prstDash val="solid"/>
+            <a:round/>
+            <a:headEnd type="none" w="med" len="med"/>
+            <a:tailEnd type="none" w="med" len="med"/>
+          </a:ln>
+          <a:effectLst/>
+        </p:spPr>
+        <p:txBody>
+          <a:bodyPr rtlCol="0" anchor="ctr"/>
+          <a:lstStyle/>
+          <a:p>
+            <a:pPr algn="ctr"/>
+            <a:r>
+              <a:rPr lang="en-US" sz="1400" dirty="0">
+                <a:solidFill>
+                  <a:schemeClr val="bg1"/>
+                </a:solidFill>
+                <a:latin typeface="Arial" panose="020B0604020202020204" pitchFamily="34" charset="0"/>
+                <a:cs typeface="Arial" panose="020B0604020202020204" pitchFamily="34" charset="0"/>
+              </a:rPr>
+              <a:t>Discuss issues encountered in two groups: Map Tiles, Vector Tiles</a:t>
+            </a:r>
+          </a:p>
+        </p:txBody>
+      </p:sp>
+      <p:sp>
+        <p:nvSpPr>
+          <p:cNvPr id="19" name="Rounded Rectangle 18">
+            <a:extLst>
+              <a:ext uri="{FF2B5EF4-FFF2-40B4-BE49-F238E27FC236}">
+                <a16:creationId xmlns:a16="http://schemas.microsoft.com/office/drawing/2014/main" id="{A945DD82-859C-6A40-96BF-E16B0B897FA0}"/>
+              </a:ext>
+            </a:extLst>
+          </p:cNvPr>
+          <p:cNvSpPr/>
+          <p:nvPr/>
+        </p:nvSpPr>
+        <p:spPr bwMode="auto">
+          <a:xfrm>
+            <a:off x="8231188" y="5832987"/>
+            <a:ext cx="3427412" cy="457200"/>
+          </a:xfrm>
+          <a:prstGeom prst="roundRect">
+            <a:avLst/>
+          </a:prstGeom>
+          <a:solidFill>
+            <a:schemeClr val="accent6">
+              <a:lumMod val="50000"/>
+            </a:schemeClr>
+          </a:solidFill>
+          <a:ln w="12700" cap="flat" cmpd="sng" algn="ctr">
+            <a:solidFill>
+              <a:srgbClr val="969696"/>
+            </a:solidFill>
+            <a:prstDash val="solid"/>
+            <a:round/>
+            <a:headEnd type="none" w="med" len="med"/>
+            <a:tailEnd type="none" w="med" len="med"/>
+          </a:ln>
+          <a:effectLst/>
+        </p:spPr>
+        <p:txBody>
+          <a:bodyPr rot="0" spcFirstLastPara="0" vertOverflow="overflow" horzOverflow="overflow" vert="horz" wrap="square" lIns="91440" tIns="45720" rIns="91440" bIns="45720" numCol="1" spcCol="0" rtlCol="0" fromWordArt="0" anchor="ctr" anchorCtr="0" forceAA="0" compatLnSpc="1">
+            <a:prstTxWarp prst="textNoShape">
+              <a:avLst/>
+            </a:prstTxWarp>
+            <a:noAutofit/>
+          </a:bodyPr>
+          <a:lstStyle/>
+          <a:p>
+            <a:pPr algn="ctr"/>
+            <a:r>
+              <a:rPr lang="en-US" sz="1400" dirty="0">
+                <a:solidFill>
+                  <a:schemeClr val="bg1"/>
+                </a:solidFill>
+                <a:latin typeface="Arial" panose="020B0604020202020204" pitchFamily="34" charset="0"/>
+                <a:cs typeface="Arial" panose="020B0604020202020204" pitchFamily="34" charset="0"/>
+              </a:rPr>
+              <a:t>Implement the API spec &amp; </a:t>
+            </a:r>
+          </a:p>
+          <a:p>
+            <a:pPr algn="ctr"/>
+            <a:r>
+              <a:rPr lang="en-US" sz="1400" dirty="0">
+                <a:solidFill>
+                  <a:schemeClr val="bg1"/>
+                </a:solidFill>
+                <a:latin typeface="Arial" panose="020B0604020202020204" pitchFamily="34" charset="0"/>
+                <a:cs typeface="Arial" panose="020B0604020202020204" pitchFamily="34" charset="0"/>
+              </a:rPr>
+              <a:t>log any </a:t>
+            </a:r>
+            <a:r>
+              <a:rPr lang="en-US" sz="1400">
+                <a:solidFill>
+                  <a:schemeClr val="bg1"/>
+                </a:solidFill>
+                <a:latin typeface="Arial" panose="020B0604020202020204" pitchFamily="34" charset="0"/>
+                <a:cs typeface="Arial" panose="020B0604020202020204" pitchFamily="34" charset="0"/>
+              </a:rPr>
+              <a:t>issues encountered</a:t>
+            </a:r>
+            <a:endParaRPr lang="en-US" sz="1400" dirty="0">
+              <a:solidFill>
+                <a:schemeClr val="bg1"/>
+              </a:solidFill>
+              <a:latin typeface="Arial" panose="020B0604020202020204" pitchFamily="34" charset="0"/>
+              <a:cs typeface="Arial" panose="020B0604020202020204" pitchFamily="34" charset="0"/>
+            </a:endParaRPr>
+          </a:p>
+        </p:txBody>
+      </p:sp>
+      <p:sp>
+        <p:nvSpPr>
+          <p:cNvPr id="20" name="Rounded Rectangle 19">
+            <a:extLst>
+              <a:ext uri="{FF2B5EF4-FFF2-40B4-BE49-F238E27FC236}">
+                <a16:creationId xmlns:a16="http://schemas.microsoft.com/office/drawing/2014/main" id="{28E8BBE9-E1E7-1E46-BF85-71D7A7F25F29}"/>
+              </a:ext>
+            </a:extLst>
+          </p:cNvPr>
+          <p:cNvSpPr/>
+          <p:nvPr/>
+        </p:nvSpPr>
+        <p:spPr bwMode="auto">
+          <a:xfrm>
+            <a:off x="8231188" y="6322154"/>
+            <a:ext cx="3427412" cy="457200"/>
+          </a:xfrm>
+          <a:prstGeom prst="roundRect">
+            <a:avLst/>
+          </a:prstGeom>
+          <a:solidFill>
+            <a:schemeClr val="accent1"/>
+          </a:solidFill>
+          <a:ln w="12700" cap="flat" cmpd="sng" algn="ctr">
+            <a:solidFill>
+              <a:srgbClr val="969696"/>
+            </a:solidFill>
+            <a:prstDash val="solid"/>
+            <a:round/>
+            <a:headEnd type="none" w="med" len="med"/>
+            <a:tailEnd type="none" w="med" len="med"/>
+          </a:ln>
+          <a:effectLst/>
+        </p:spPr>
+        <p:txBody>
+          <a:bodyPr rtlCol="0" anchor="ctr"/>
+          <a:lstStyle/>
+          <a:p>
+            <a:pPr algn="ctr"/>
+            <a:r>
+              <a:rPr lang="en-US" sz="1400" dirty="0">
+                <a:solidFill>
+                  <a:schemeClr val="bg1"/>
+                </a:solidFill>
+                <a:latin typeface="Arial" panose="020B0604020202020204" pitchFamily="34" charset="0"/>
+                <a:cs typeface="Arial" panose="020B0604020202020204" pitchFamily="34" charset="0"/>
+              </a:rPr>
+              <a:t>Report back on progress</a:t>
+            </a:r>
+          </a:p>
+        </p:txBody>
+      </p:sp>
+      <p:sp>
+        <p:nvSpPr>
+          <p:cNvPr id="21" name="Rounded Rectangle 20">
+            <a:extLst>
+              <a:ext uri="{FF2B5EF4-FFF2-40B4-BE49-F238E27FC236}">
+                <a16:creationId xmlns:a16="http://schemas.microsoft.com/office/drawing/2014/main" id="{73D51F66-21EF-E84A-AA57-53A011722DDE}"/>
+              </a:ext>
+            </a:extLst>
+          </p:cNvPr>
+          <p:cNvSpPr/>
+          <p:nvPr/>
+        </p:nvSpPr>
+        <p:spPr bwMode="auto">
+          <a:xfrm>
+            <a:off x="8265601" y="5279916"/>
+            <a:ext cx="3427412" cy="457200"/>
+          </a:xfrm>
+          <a:prstGeom prst="roundRect">
+            <a:avLst/>
+          </a:prstGeom>
+          <a:solidFill>
+            <a:schemeClr val="accent1"/>
+          </a:solidFill>
+          <a:ln w="12700" cap="flat" cmpd="sng" algn="ctr">
+            <a:solidFill>
+              <a:srgbClr val="969696"/>
+            </a:solidFill>
+            <a:prstDash val="solid"/>
+            <a:round/>
+            <a:headEnd type="none" w="med" len="med"/>
+            <a:tailEnd type="none" w="med" len="med"/>
+          </a:ln>
+          <a:effectLst/>
+        </p:spPr>
+        <p:txBody>
+          <a:bodyPr rot="0" spcFirstLastPara="0" vertOverflow="overflow" horzOverflow="overflow" vert="horz" wrap="square" lIns="91440" tIns="45720" rIns="91440" bIns="45720" numCol="1" spcCol="0" rtlCol="0" fromWordArt="0" anchor="ctr" anchorCtr="0" forceAA="0" compatLnSpc="1">
+            <a:prstTxWarp prst="textNoShape">
+              <a:avLst/>
+            </a:prstTxWarp>
+            <a:noAutofit/>
+          </a:bodyPr>
+          <a:lstStyle/>
+          <a:p>
+            <a:pPr algn="ctr"/>
+            <a:r>
+              <a:rPr lang="en-US" sz="1400" dirty="0">
+                <a:solidFill>
+                  <a:schemeClr val="bg1"/>
+                </a:solidFill>
+                <a:latin typeface="Arial" panose="020B0604020202020204" pitchFamily="34" charset="0"/>
+                <a:cs typeface="Arial" panose="020B0604020202020204" pitchFamily="34" charset="0"/>
+              </a:rPr>
+              <a:t>Discuss overarching issues affecting Core Tiles API or Common</a:t>
+            </a:r>
+          </a:p>
+        </p:txBody>
+      </p:sp>
     </p:spTree>
     <p:extLst>
       <p:ext uri="{BB962C8B-B14F-4D97-AF65-F5344CB8AC3E}">
-        <p14:creationId xmlns:p14="http://schemas.microsoft.com/office/powerpoint/2010/main" val="3060705504"/>
+        <p14:creationId xmlns:p14="http://schemas.microsoft.com/office/powerpoint/2010/main" val="1069068833"/>
       </p:ext>
     </p:extLst>
   </p:cSld>
   <p:clrMapOvr>
     <a:masterClrMapping/>
   </p:clrMapOvr>
+  <p:timing>
+    <p:tnLst>
+      <p:par>
+        <p:cTn id="1" dur="indefinite" restart="never" nodeType="tmRoot">
+          <p:childTnLst>
+            <p:seq concurrent="1" nextAc="seek">
+              <p:cTn id="2" dur="indefinite" nodeType="mainSeq">
+                <p:childTnLst>
+                  <p:par>
+                    <p:cTn id="3" fill="hold">
+                      <p:stCondLst>
+                        <p:cond delay="indefinite"/>
+                      </p:stCondLst>
+                      <p:childTnLst>
+                        <p:par>
+                          <p:cTn id="4" fill="hold">
+                            <p:stCondLst>
+                              <p:cond delay="0"/>
+                            </p:stCondLst>
+                            <p:childTnLst>
+                              <p:par>
+                                <p:cTn id="5" presetID="1" presetClass="entr" presetSubtype="0" fill="hold" grpId="0" nodeType="clickEffect">
+                                  <p:stCondLst>
+                                    <p:cond delay="0"/>
+                                  </p:stCondLst>
+                                  <p:childTnLst>
+                                    <p:set>
+                                      <p:cBhvr>
+                                        <p:cTn id="6" dur="1" fill="hold">
+                                          <p:stCondLst>
+                                            <p:cond delay="0"/>
+                                          </p:stCondLst>
+                                        </p:cTn>
+                                        <p:tgtEl>
+                                          <p:spTgt spid="17"/>
+                                        </p:tgtEl>
+                                        <p:attrNameLst>
+                                          <p:attrName>style.visibility</p:attrName>
+                                        </p:attrNameLst>
+                                      </p:cBhvr>
+                                      <p:to>
+                                        <p:strVal val="visible"/>
+                                      </p:to>
+                                    </p:set>
+                                  </p:childTnLst>
+                                </p:cTn>
+                              </p:par>
+                            </p:childTnLst>
+                          </p:cTn>
+                        </p:par>
+                      </p:childTnLst>
+                    </p:cTn>
+                  </p:par>
+                  <p:par>
+                    <p:cTn id="7" fill="hold">
+                      <p:stCondLst>
+                        <p:cond delay="indefinite"/>
+                      </p:stCondLst>
+                      <p:childTnLst>
+                        <p:par>
+                          <p:cTn id="8" fill="hold">
+                            <p:stCondLst>
+                              <p:cond delay="0"/>
+                            </p:stCondLst>
+                            <p:childTnLst>
+                              <p:par>
+                                <p:cTn id="9" presetID="1" presetClass="entr" presetSubtype="0" fill="hold" grpId="0" nodeType="clickEffect">
+                                  <p:stCondLst>
+                                    <p:cond delay="0"/>
+                                  </p:stCondLst>
+                                  <p:childTnLst>
+                                    <p:set>
+                                      <p:cBhvr>
+                                        <p:cTn id="10" dur="1" fill="hold">
+                                          <p:stCondLst>
+                                            <p:cond delay="0"/>
+                                          </p:stCondLst>
+                                        </p:cTn>
+                                        <p:tgtEl>
+                                          <p:spTgt spid="18"/>
+                                        </p:tgtEl>
+                                        <p:attrNameLst>
+                                          <p:attrName>style.visibility</p:attrName>
+                                        </p:attrNameLst>
+                                      </p:cBhvr>
+                                      <p:to>
+                                        <p:strVal val="visible"/>
+                                      </p:to>
+                                    </p:set>
+                                  </p:childTnLst>
+                                </p:cTn>
+                              </p:par>
+                            </p:childTnLst>
+                          </p:cTn>
+                        </p:par>
+                      </p:childTnLst>
+                    </p:cTn>
+                  </p:par>
+                  <p:par>
+                    <p:cTn id="11" fill="hold">
+                      <p:stCondLst>
+                        <p:cond delay="indefinite"/>
+                      </p:stCondLst>
+                      <p:childTnLst>
+                        <p:par>
+                          <p:cTn id="12" fill="hold">
+                            <p:stCondLst>
+                              <p:cond delay="0"/>
+                            </p:stCondLst>
+                            <p:childTnLst>
+                              <p:par>
+                                <p:cTn id="13" presetID="1" presetClass="entr" presetSubtype="0" fill="hold" grpId="0" nodeType="clickEffect">
+                                  <p:stCondLst>
+                                    <p:cond delay="0"/>
+                                  </p:stCondLst>
+                                  <p:childTnLst>
+                                    <p:set>
+                                      <p:cBhvr>
+                                        <p:cTn id="14" dur="1" fill="hold">
+                                          <p:stCondLst>
+                                            <p:cond delay="0"/>
+                                          </p:stCondLst>
+                                        </p:cTn>
+                                        <p:tgtEl>
+                                          <p:spTgt spid="21"/>
+                                        </p:tgtEl>
+                                        <p:attrNameLst>
+                                          <p:attrName>style.visibility</p:attrName>
+                                        </p:attrNameLst>
+                                      </p:cBhvr>
+                                      <p:to>
+                                        <p:strVal val="visible"/>
+                                      </p:to>
+                                    </p:set>
+                                  </p:childTnLst>
+                                </p:cTn>
+                              </p:par>
+                            </p:childTnLst>
+                          </p:cTn>
+                        </p:par>
+                      </p:childTnLst>
+                    </p:cTn>
+                  </p:par>
+                  <p:par>
+                    <p:cTn id="15" fill="hold">
+                      <p:stCondLst>
+                        <p:cond delay="indefinite"/>
+                      </p:stCondLst>
+                      <p:childTnLst>
+                        <p:par>
+                          <p:cTn id="16" fill="hold">
+                            <p:stCondLst>
+                              <p:cond delay="0"/>
+                            </p:stCondLst>
+                            <p:childTnLst>
+                              <p:par>
+                                <p:cTn id="17" presetID="1" presetClass="entr" presetSubtype="0" fill="hold" grpId="0" nodeType="clickEffect">
+                                  <p:stCondLst>
+                                    <p:cond delay="0"/>
+                                  </p:stCondLst>
+                                  <p:childTnLst>
+                                    <p:set>
+                                      <p:cBhvr>
+                                        <p:cTn id="18" dur="1" fill="hold">
+                                          <p:stCondLst>
+                                            <p:cond delay="0"/>
+                                          </p:stCondLst>
+                                        </p:cTn>
+                                        <p:tgtEl>
+                                          <p:spTgt spid="19"/>
+                                        </p:tgtEl>
+                                        <p:attrNameLst>
+                                          <p:attrName>style.visibility</p:attrName>
+                                        </p:attrNameLst>
+                                      </p:cBhvr>
+                                      <p:to>
+                                        <p:strVal val="visible"/>
+                                      </p:to>
+                                    </p:set>
+                                  </p:childTnLst>
+                                </p:cTn>
+                              </p:par>
+                            </p:childTnLst>
+                          </p:cTn>
+                        </p:par>
+                      </p:childTnLst>
+                    </p:cTn>
+                  </p:par>
+                  <p:par>
+                    <p:cTn id="19" fill="hold">
+                      <p:stCondLst>
+                        <p:cond delay="indefinite"/>
+                      </p:stCondLst>
+                      <p:childTnLst>
+                        <p:par>
+                          <p:cTn id="20" fill="hold">
+                            <p:stCondLst>
+                              <p:cond delay="0"/>
+                            </p:stCondLst>
+                            <p:childTnLst>
+                              <p:par>
+                                <p:cTn id="21" presetID="1" presetClass="entr" presetSubtype="0" fill="hold" grpId="0" nodeType="clickEffect">
+                                  <p:stCondLst>
+                                    <p:cond delay="0"/>
+                                  </p:stCondLst>
+                                  <p:childTnLst>
+                                    <p:set>
+                                      <p:cBhvr>
+                                        <p:cTn id="22" dur="1" fill="hold">
+                                          <p:stCondLst>
+                                            <p:cond delay="0"/>
+                                          </p:stCondLst>
+                                        </p:cTn>
+                                        <p:tgtEl>
+                                          <p:spTgt spid="20"/>
+                                        </p:tgtEl>
+                                        <p:attrNameLst>
+                                          <p:attrName>style.visibility</p:attrName>
+                                        </p:attrNameLst>
+                                      </p:cBhvr>
+                                      <p:to>
+                                        <p:strVal val="visible"/>
+                                      </p:to>
+                                    </p:set>
+                                  </p:childTnLst>
+                                </p:cTn>
+                              </p:par>
+                            </p:childTnLst>
+                          </p:cTn>
+                        </p:par>
+                      </p:childTnLst>
+                    </p:cTn>
+                  </p:par>
+                </p:childTnLst>
+              </p:cTn>
+              <p:prevCondLst>
+                <p:cond evt="onPrev" delay="0">
+                  <p:tgtEl>
+                    <p:sldTgt/>
+                  </p:tgtEl>
+                </p:cond>
+              </p:prevCondLst>
+              <p:nextCondLst>
+                <p:cond evt="onNext" delay="0">
+                  <p:tgtEl>
+                    <p:sldTgt/>
+                  </p:tgtEl>
+                </p:cond>
+              </p:nextCondLst>
+            </p:seq>
+          </p:childTnLst>
+        </p:cTn>
+      </p:par>
+    </p:tnLst>
+    <p:bldLst>
+      <p:bldP spid="17" grpId="0" animBg="1"/>
+      <p:bldP spid="18" grpId="0" animBg="1"/>
+      <p:bldP spid="19" grpId="0" animBg="1"/>
+      <p:bldP spid="20" grpId="0" animBg="1"/>
+      <p:bldP spid="21" grpId="0" animBg="1"/>
+    </p:bldLst>
+  </p:timing>
 </p:sld>
 </file>
 

</xml_diff>